<commit_message>
Fixup Intro to DHTC slides
</commit_message>
<xml_diff>
--- a/docs/materials/day2/files/osgus18-day2-part1-intro-to-dhtc.pptx
+++ b/docs/materials/day2/files/osgus18-day2-part1-intro-to-dhtc.pptx
@@ -42,20 +42,21 @@
     <p:sldId id="286" r:id="rId36"/>
     <p:sldId id="287" r:id="rId37"/>
     <p:sldId id="288" r:id="rId38"/>
+    <p:sldId id="289" r:id="rId39"/>
   </p:sldIdLst>
   <p:sldSz cy="5143500" cx="9144000"/>
   <p:notesSz cx="6858000" cy="9144000"/>
   <p:embeddedFontLst>
     <p:embeddedFont>
       <p:font typeface="Carme"/>
-      <p:regular r:id="rId39"/>
+      <p:regular r:id="rId40"/>
     </p:embeddedFont>
     <p:embeddedFont>
       <p:font typeface="Source Sans Pro"/>
-      <p:regular r:id="rId40"/>
-      <p:bold r:id="rId41"/>
-      <p:italic r:id="rId42"/>
-      <p:boldItalic r:id="rId43"/>
+      <p:regular r:id="rId41"/>
+      <p:bold r:id="rId42"/>
+      <p:italic r:id="rId43"/>
+      <p:boldItalic r:id="rId44"/>
     </p:embeddedFont>
   </p:embeddedFontLst>
   <p:defaultTextStyle>
@@ -2904,7 +2905,7 @@
           </a:bodyPr>
           <a:lstStyle/>
           <a:p>
-            <a:pPr indent="0" lvl="0" marL="0">
+            <a:pPr indent="0" lvl="0" marL="0" rtl="0">
               <a:spcBef>
                 <a:spcPts val="0"/>
               </a:spcBef>
@@ -3227,7 +3228,7 @@
   <p:cSld>
     <p:spTree>
       <p:nvGrpSpPr>
-        <p:cNvPr id="766" name="Shape 766"/>
+        <p:cNvPr id="764" name="Shape 764"/>
         <p:cNvGrpSpPr/>
         <p:nvPr/>
       </p:nvGrpSpPr>
@@ -3241,7 +3242,7 @@
       </p:grpSpPr>
       <p:sp>
         <p:nvSpPr>
-          <p:cNvPr id="767" name="Shape 767"/>
+          <p:cNvPr id="765" name="Shape 765"/>
           <p:cNvSpPr/>
           <p:nvPr>
             <p:ph idx="2" type="sldImg"/>
@@ -3275,7 +3276,7 @@
       </p:sp>
       <p:sp>
         <p:nvSpPr>
-          <p:cNvPr id="768" name="Shape 768"/>
+          <p:cNvPr id="766" name="Shape 766"/>
           <p:cNvSpPr txBox="1"/>
           <p:nvPr>
             <p:ph idx="1" type="body"/>
@@ -3296,7 +3297,7 @@
           </a:bodyPr>
           <a:lstStyle/>
           <a:p>
-            <a:pPr indent="0" lvl="0" marL="0" rtl="0">
+            <a:pPr indent="0" lvl="0" marL="0">
               <a:spcBef>
                 <a:spcPts val="0"/>
               </a:spcBef>
@@ -3374,6 +3375,104 @@
       <p:sp>
         <p:nvSpPr>
           <p:cNvPr id="775" name="Shape 775"/>
+          <p:cNvSpPr txBox="1"/>
+          <p:nvPr>
+            <p:ph idx="1" type="body"/>
+          </p:nvPr>
+        </p:nvSpPr>
+        <p:spPr>
+          <a:xfrm>
+            <a:off x="685800" y="4343400"/>
+            <a:ext cx="5486400" cy="4114800"/>
+          </a:xfrm>
+          <a:prstGeom prst="rect">
+            <a:avLst/>
+          </a:prstGeom>
+        </p:spPr>
+        <p:txBody>
+          <a:bodyPr anchorCtr="0" anchor="t" bIns="91425" lIns="91425" spcFirstLastPara="1" rIns="91425" wrap="square" tIns="91425">
+            <a:noAutofit/>
+          </a:bodyPr>
+          <a:lstStyle/>
+          <a:p>
+            <a:pPr indent="0" lvl="0" marL="0" rtl="0">
+              <a:spcBef>
+                <a:spcPts val="0"/>
+              </a:spcBef>
+              <a:spcAft>
+                <a:spcPts val="0"/>
+              </a:spcAft>
+              <a:buNone/>
+            </a:pPr>
+            <a:r>
+              <a:t/>
+            </a:r>
+            <a:endParaRPr/>
+          </a:p>
+        </p:txBody>
+      </p:sp>
+    </p:spTree>
+  </p:cSld>
+  <p:clrMapOvr>
+    <a:masterClrMapping/>
+  </p:clrMapOvr>
+</p:notes>
+</file>
+
+<file path=ppt/notesSlides/notesSlide34.xml><?xml version="1.0" encoding="utf-8"?>
+<p:notes xmlns:a="http://schemas.openxmlformats.org/drawingml/2006/main" xmlns:r="http://schemas.openxmlformats.org/officeDocument/2006/relationships" xmlns:mc="http://schemas.openxmlformats.org/markup-compatibility/2006" xmlns:mv="urn:schemas-microsoft-com:mac:vml" xmlns:p="http://schemas.openxmlformats.org/presentationml/2006/main" xmlns:c="http://schemas.openxmlformats.org/drawingml/2006/chart" xmlns:dgm="http://schemas.openxmlformats.org/drawingml/2006/diagram" xmlns:o="urn:schemas-microsoft-com:office:office" xmlns:v="urn:schemas-microsoft-com:vml" xmlns:pvml="urn:schemas-microsoft-com:office:powerpoint" xmlns:com="http://schemas.openxmlformats.org/drawingml/2006/compatibility" xmlns:p14="http://schemas.microsoft.com/office/powerpoint/2010/main" xmlns:p15="http://schemas.microsoft.com/office/powerpoint/2012/main" showMasterPhAnim="0" showMasterSp="0">
+  <p:cSld>
+    <p:spTree>
+      <p:nvGrpSpPr>
+        <p:cNvPr id="780" name="Shape 780"/>
+        <p:cNvGrpSpPr/>
+        <p:nvPr/>
+      </p:nvGrpSpPr>
+      <p:grpSpPr>
+        <a:xfrm>
+          <a:off x="0" y="0"/>
+          <a:ext cx="0" cy="0"/>
+          <a:chOff x="0" y="0"/>
+          <a:chExt cx="0" cy="0"/>
+        </a:xfrm>
+      </p:grpSpPr>
+      <p:sp>
+        <p:nvSpPr>
+          <p:cNvPr id="781" name="Shape 781"/>
+          <p:cNvSpPr/>
+          <p:nvPr>
+            <p:ph idx="2" type="sldImg"/>
+          </p:nvPr>
+        </p:nvSpPr>
+        <p:spPr>
+          <a:xfrm>
+            <a:off x="381175" y="685800"/>
+            <a:ext cx="6096300" cy="3429000"/>
+          </a:xfrm>
+          <a:custGeom>
+            <a:pathLst>
+              <a:path extrusionOk="0" h="120000" w="120000">
+                <a:moveTo>
+                  <a:pt x="0" y="0"/>
+                </a:moveTo>
+                <a:lnTo>
+                  <a:pt x="120000" y="0"/>
+                </a:lnTo>
+                <a:lnTo>
+                  <a:pt x="120000" y="120000"/>
+                </a:lnTo>
+                <a:lnTo>
+                  <a:pt x="0" y="120000"/>
+                </a:lnTo>
+                <a:close/>
+              </a:path>
+            </a:pathLst>
+          </a:custGeom>
+        </p:spPr>
+      </p:sp>
+      <p:sp>
+        <p:nvSpPr>
+          <p:cNvPr id="782" name="Shape 782"/>
           <p:cNvSpPr txBox="1"/>
           <p:nvPr>
             <p:ph idx="1" type="body"/>
@@ -27806,7 +27905,7 @@
                   <a:srgbClr val="000080"/>
                 </a:solidFill>
               </a:rPr>
-              <a:t>Obtain sharing agreements</a:t>
+              <a:t>Obtain login access</a:t>
             </a:r>
             <a:endParaRPr sz="2400">
               <a:solidFill>
@@ -31522,7 +31621,7 @@
                   <a:srgbClr val="000080"/>
                 </a:solidFill>
               </a:rPr>
-              <a:t>Fewer agreements = fewer potential resources</a:t>
+              <a:t>Fewer logins = fewer potential resources</a:t>
             </a:r>
             <a:endParaRPr sz="2400">
               <a:solidFill>
@@ -31547,7 +31646,7 @@
                   <a:srgbClr val="000080"/>
                 </a:solidFill>
               </a:rPr>
-              <a:t>More agreements = more account management</a:t>
+              <a:t>More logins = more account management</a:t>
             </a:r>
             <a:endParaRPr sz="2400">
               <a:solidFill>
@@ -31572,7 +31671,7 @@
                   <a:srgbClr val="000080"/>
                 </a:solidFill>
               </a:rPr>
-              <a:t>Querying and partitioning is tedious and inaccurate</a:t>
+              <a:t>Why would they give you accounts? Are your friends going to want CHTC accounts?</a:t>
             </a:r>
             <a:endParaRPr sz="2400">
               <a:solidFill>
@@ -31597,7 +31696,7 @@
                   <a:srgbClr val="000080"/>
                 </a:solidFill>
               </a:rPr>
-              <a:t>Are you allowed to share? Do you have anything to share?</a:t>
+              <a:t>Querying and splitting jobs is tedious and inaccurate</a:t>
             </a:r>
             <a:endParaRPr sz="2400">
               <a:solidFill>
@@ -33070,13 +33169,9 @@
                   <a:srgbClr val="000080"/>
                 </a:solidFill>
               </a:rPr>
-              <a:t>No job partitioning</a:t>
+              <a:t>No job splitting</a:t>
             </a:r>
-            <a:endParaRPr sz="2400">
-              <a:solidFill>
-                <a:srgbClr val="000080"/>
-              </a:solidFill>
-            </a:endParaRPr>
+            <a:endParaRPr/>
           </a:p>
           <a:p>
             <a:pPr indent="-381000" lvl="0" marL="457200" rtl="0">
@@ -45601,7 +45696,7 @@
         <p:spPr>
           <a:xfrm>
             <a:off x="1228725" y="85725"/>
-            <a:ext cx="7848600" cy="857400"/>
+            <a:ext cx="7496100" cy="857400"/>
           </a:xfrm>
           <a:prstGeom prst="rect">
             <a:avLst/>
@@ -45624,7 +45719,7 @@
             </a:pPr>
             <a:r>
               <a:rPr lang="en" sz="3200"/>
-              <a:t>The OSG Model</a:t>
+              <a:t>#3: Share Resources - Requirements</a:t>
             </a:r>
             <a:endParaRPr sz="3200"/>
           </a:p>
@@ -45653,18 +45748,14 @@
           </a:bodyPr>
           <a:lstStyle/>
           <a:p>
-            <a:pPr indent="-381000" lvl="0" marL="457200" marR="0" rtl="0" algn="l">
-              <a:lnSpc>
-                <a:spcPct val="100000"/>
-              </a:lnSpc>
-              <a:spcBef>
-                <a:spcPts val="600"/>
+            <a:pPr indent="-381000" lvl="0" marL="457200" rtl="0">
+              <a:spcBef>
+                <a:spcPts val="640"/>
               </a:spcBef>
               <a:spcAft>
                 <a:spcPts val="0"/>
               </a:spcAft>
               <a:buSzPts val="2400"/>
-              <a:buFont typeface="Source Sans Pro"/>
               <a:buChar char="•"/>
             </a:pPr>
             <a:r>
@@ -45673,7 +45764,7 @@
                   <a:srgbClr val="000080"/>
                 </a:solidFill>
               </a:rPr>
-              <a:t>Pilot jobs (or pilots) are special jobs</a:t>
+              <a:t>Minimal account management: only one submit server</a:t>
             </a:r>
             <a:endParaRPr sz="2400">
               <a:solidFill>
@@ -45682,12 +45773,9 @@
             </a:endParaRPr>
           </a:p>
           <a:p>
-            <a:pPr indent="-381000" lvl="0" marL="457200" marR="0" rtl="0" algn="l">
-              <a:lnSpc>
-                <a:spcPct val="100000"/>
-              </a:lnSpc>
-              <a:spcBef>
-                <a:spcPts val="0"/>
+            <a:pPr indent="-381000" lvl="0" marL="457200" rtl="0">
+              <a:spcBef>
+                <a:spcPts val="640"/>
               </a:spcBef>
               <a:spcAft>
                 <a:spcPts val="0"/>
@@ -45701,7 +45789,7 @@
                   <a:srgbClr val="000080"/>
                 </a:solidFill>
               </a:rPr>
-              <a:t>Pilots are sent to sites with idle resources</a:t>
+              <a:t>No job splitting: only one HTCondor pool</a:t>
             </a:r>
             <a:endParaRPr sz="2400">
               <a:solidFill>
@@ -45710,12 +45798,9 @@
             </a:endParaRPr>
           </a:p>
           <a:p>
-            <a:pPr indent="-381000" lvl="0" marL="457200" marR="0" rtl="0" algn="l">
-              <a:lnSpc>
-                <a:spcPct val="100000"/>
-              </a:lnSpc>
-              <a:spcBef>
-                <a:spcPts val="0"/>
+            <a:pPr indent="-381000" lvl="0" marL="457200" rtl="0">
+              <a:spcBef>
+                <a:spcPts val="640"/>
               </a:spcBef>
               <a:spcAft>
                 <a:spcPts val="0"/>
@@ -45729,7 +45814,7 @@
                   <a:srgbClr val="000080"/>
                 </a:solidFill>
               </a:rPr>
-              <a:t>Pilot payload = HTCondor execute node software</a:t>
+              <a:t>DAG workflow functionality: Only one HTCondor pool</a:t>
             </a:r>
             <a:endParaRPr sz="2400">
               <a:solidFill>
@@ -45738,12 +45823,9 @@
             </a:endParaRPr>
           </a:p>
           <a:p>
-            <a:pPr indent="-381000" lvl="0" marL="457200" marR="0" rtl="0" algn="l">
-              <a:lnSpc>
-                <a:spcPct val="100000"/>
-              </a:lnSpc>
-              <a:spcBef>
-                <a:spcPts val="0"/>
+            <a:pPr indent="-381000" lvl="0" marL="457200" rtl="0">
+              <a:spcBef>
+                <a:spcPts val="640"/>
               </a:spcBef>
               <a:spcAft>
                 <a:spcPts val="0"/>
@@ -45757,7 +45839,7 @@
                   <a:srgbClr val="000080"/>
                 </a:solidFill>
               </a:rPr>
-              <a:t>Pilot execute node reports to your OSG pool</a:t>
+              <a:t>HTCondor only: Only one HTCondor pool</a:t>
             </a:r>
             <a:endParaRPr sz="2400">
               <a:solidFill>
@@ -45766,19 +45848,13 @@
             </a:endParaRPr>
           </a:p>
           <a:p>
-            <a:pPr indent="-381000" lvl="0" marL="457200" marR="0" rtl="0" algn="l">
-              <a:lnSpc>
-                <a:spcPct val="100000"/>
-              </a:lnSpc>
-              <a:spcBef>
-                <a:spcPts val="0"/>
-              </a:spcBef>
-              <a:spcAft>
-                <a:spcPts val="0"/>
-              </a:spcAft>
-              <a:buClr>
-                <a:srgbClr val="000080"/>
-              </a:buClr>
+            <a:pPr indent="-381000" lvl="0" marL="457200" rtl="0">
+              <a:spcBef>
+                <a:spcPts val="640"/>
+              </a:spcBef>
+              <a:spcAft>
+                <a:spcPts val="0"/>
+              </a:spcAft>
               <a:buSzPts val="2400"/>
               <a:buChar char="•"/>
             </a:pPr>
@@ -45788,79 +45864,9 @@
                   <a:srgbClr val="000080"/>
                 </a:solidFill>
               </a:rPr>
-              <a:t>Pilots lease resources:</a:t>
+              <a:t>No resource sharing requirements: the OSG doesn’t require that users “pay into” the OSG</a:t>
             </a:r>
             <a:endParaRPr sz="2400">
-              <a:solidFill>
-                <a:srgbClr val="000080"/>
-              </a:solidFill>
-            </a:endParaRPr>
-          </a:p>
-          <a:p>
-            <a:pPr indent="-342900" lvl="1" marL="914400" marR="0" rtl="0" algn="l">
-              <a:lnSpc>
-                <a:spcPct val="100000"/>
-              </a:lnSpc>
-              <a:spcBef>
-                <a:spcPts val="0"/>
-              </a:spcBef>
-              <a:spcAft>
-                <a:spcPts val="0"/>
-              </a:spcAft>
-              <a:buClr>
-                <a:srgbClr val="000080"/>
-              </a:buClr>
-              <a:buSzPts val="1800"/>
-              <a:buChar char="−"/>
-            </a:pPr>
-            <a:r>
-              <a:rPr lang="en" sz="1800">
-                <a:solidFill>
-                  <a:srgbClr val="000080"/>
-                </a:solidFill>
-              </a:rPr>
-              <a:t>Lease expires after </a:t>
-            </a:r>
-            <a:r>
-              <a:rPr lang="en" sz="1800">
-                <a:solidFill>
-                  <a:srgbClr val="000080"/>
-                </a:solidFill>
-              </a:rPr>
-              <a:t>a set amount of time or lack of demand</a:t>
-            </a:r>
-            <a:endParaRPr sz="1800">
-              <a:solidFill>
-                <a:srgbClr val="000080"/>
-              </a:solidFill>
-            </a:endParaRPr>
-          </a:p>
-          <a:p>
-            <a:pPr indent="-342900" lvl="1" marL="914400" marR="0" rtl="0" algn="l">
-              <a:lnSpc>
-                <a:spcPct val="100000"/>
-              </a:lnSpc>
-              <a:spcBef>
-                <a:spcPts val="0"/>
-              </a:spcBef>
-              <a:spcAft>
-                <a:spcPts val="0"/>
-              </a:spcAft>
-              <a:buClr>
-                <a:srgbClr val="000080"/>
-              </a:buClr>
-              <a:buSzPts val="1800"/>
-              <a:buChar char="−"/>
-            </a:pPr>
-            <a:r>
-              <a:rPr lang="en" sz="1800">
-                <a:solidFill>
-                  <a:srgbClr val="000080"/>
-                </a:solidFill>
-              </a:rPr>
-              <a:t>Leases can be revoked!</a:t>
-            </a:r>
-            <a:endParaRPr sz="1800">
               <a:solidFill>
                 <a:srgbClr val="000080"/>
               </a:solidFill>
@@ -45891,7 +45897,7 @@
           </a:bodyPr>
           <a:lstStyle/>
           <a:p>
-            <a:pPr indent="0" lvl="0" marL="0">
+            <a:pPr indent="0" lvl="0" marL="0" rtl="0">
               <a:spcBef>
                 <a:spcPts val="0"/>
               </a:spcBef>
@@ -46458,7 +46464,7 @@
         <p:spPr>
           <a:xfrm>
             <a:off x="1228725" y="85725"/>
-            <a:ext cx="7551900" cy="857400"/>
+            <a:ext cx="7848600" cy="857400"/>
           </a:xfrm>
           <a:prstGeom prst="rect">
             <a:avLst/>
@@ -46481,11 +46487,7 @@
             </a:pPr>
             <a:r>
               <a:rPr lang="en" sz="3200"/>
-              <a:t>The OSG Model </a:t>
-            </a:r>
-            <a:r>
-              <a:rPr lang="en" sz="3200"/>
-              <a:t>- Leasing the Cloud</a:t>
+              <a:t>The OSG Model - Recap</a:t>
             </a:r>
             <a:endParaRPr sz="3200"/>
           </a:p>
@@ -46525,6 +46527,7 @@
                 <a:spcPts val="0"/>
               </a:spcAft>
               <a:buSzPts val="2400"/>
+              <a:buFont typeface="Source Sans Pro"/>
               <a:buChar char="•"/>
             </a:pPr>
             <a:r>
@@ -46533,7 +46536,7 @@
                   <a:srgbClr val="000080"/>
                 </a:solidFill>
               </a:rPr>
-              <a:t>What if there aren’t enough idle resources?</a:t>
+              <a:t>Pilot jobs (or pilots) are special jobs</a:t>
             </a:r>
             <a:endParaRPr sz="2400">
               <a:solidFill>
@@ -46561,7 +46564,7 @@
                   <a:srgbClr val="000080"/>
                 </a:solidFill>
               </a:rPr>
-              <a:t>Combine overlay system with cloud technology</a:t>
+              <a:t>Pilots are sent to sites with idle resources</a:t>
             </a:r>
             <a:endParaRPr sz="2400">
               <a:solidFill>
@@ -46589,7 +46592,7 @@
                   <a:srgbClr val="000080"/>
                 </a:solidFill>
               </a:rPr>
-              <a:t>Some of your OSG jobs may run in the cloud in the next few years</a:t>
+              <a:t>Pilot payload = HTCondor execute node software</a:t>
             </a:r>
             <a:endParaRPr sz="2400">
               <a:solidFill>
@@ -46608,9 +46611,6 @@
               <a:spcAft>
                 <a:spcPts val="0"/>
               </a:spcAft>
-              <a:buClr>
-                <a:srgbClr val="000080"/>
-              </a:buClr>
               <a:buSzPts val="2400"/>
               <a:buChar char="•"/>
             </a:pPr>
@@ -46620,9 +46620,110 @@
                   <a:srgbClr val="000080"/>
                 </a:solidFill>
               </a:rPr>
-              <a:t>… but this should be completely transparent to you</a:t>
+              <a:t>Pilot execute node reports to your OSG pool</a:t>
             </a:r>
             <a:endParaRPr sz="2400">
+              <a:solidFill>
+                <a:srgbClr val="000080"/>
+              </a:solidFill>
+            </a:endParaRPr>
+          </a:p>
+          <a:p>
+            <a:pPr indent="-381000" lvl="0" marL="457200" marR="0" rtl="0" algn="l">
+              <a:lnSpc>
+                <a:spcPct val="100000"/>
+              </a:lnSpc>
+              <a:spcBef>
+                <a:spcPts val="0"/>
+              </a:spcBef>
+              <a:spcAft>
+                <a:spcPts val="0"/>
+              </a:spcAft>
+              <a:buClr>
+                <a:srgbClr val="000080"/>
+              </a:buClr>
+              <a:buSzPts val="2400"/>
+              <a:buChar char="•"/>
+            </a:pPr>
+            <a:r>
+              <a:rPr lang="en" sz="2400">
+                <a:solidFill>
+                  <a:srgbClr val="000080"/>
+                </a:solidFill>
+              </a:rPr>
+              <a:t>Pilots lease resources:</a:t>
+            </a:r>
+            <a:endParaRPr sz="2400">
+              <a:solidFill>
+                <a:srgbClr val="000080"/>
+              </a:solidFill>
+            </a:endParaRPr>
+          </a:p>
+          <a:p>
+            <a:pPr indent="-342900" lvl="1" marL="914400" marR="0" rtl="0" algn="l">
+              <a:lnSpc>
+                <a:spcPct val="100000"/>
+              </a:lnSpc>
+              <a:spcBef>
+                <a:spcPts val="0"/>
+              </a:spcBef>
+              <a:spcAft>
+                <a:spcPts val="0"/>
+              </a:spcAft>
+              <a:buClr>
+                <a:srgbClr val="000080"/>
+              </a:buClr>
+              <a:buSzPts val="1800"/>
+              <a:buChar char="−"/>
+            </a:pPr>
+            <a:r>
+              <a:rPr lang="en" sz="1800">
+                <a:solidFill>
+                  <a:srgbClr val="000080"/>
+                </a:solidFill>
+              </a:rPr>
+              <a:t>Lease expires after </a:t>
+            </a:r>
+            <a:r>
+              <a:rPr lang="en" sz="1800">
+                <a:solidFill>
+                  <a:srgbClr val="000080"/>
+                </a:solidFill>
+              </a:rPr>
+              <a:t>a set amount of time or lack of demand</a:t>
+            </a:r>
+            <a:endParaRPr sz="1800">
+              <a:solidFill>
+                <a:srgbClr val="000080"/>
+              </a:solidFill>
+            </a:endParaRPr>
+          </a:p>
+          <a:p>
+            <a:pPr indent="-342900" lvl="1" marL="914400" marR="0" rtl="0" algn="l">
+              <a:lnSpc>
+                <a:spcPct val="100000"/>
+              </a:lnSpc>
+              <a:spcBef>
+                <a:spcPts val="0"/>
+              </a:spcBef>
+              <a:spcAft>
+                <a:spcPts val="0"/>
+              </a:spcAft>
+              <a:buClr>
+                <a:srgbClr val="000080"/>
+              </a:buClr>
+              <a:buSzPts val="1800"/>
+              <a:buChar char="−"/>
+            </a:pPr>
+            <a:r>
+              <a:rPr lang="en" sz="1800">
+                <a:solidFill>
+                  <a:srgbClr val="000080"/>
+                </a:solidFill>
+              </a:rPr>
+              <a:t>Leases can be revoked!</a:t>
+            </a:r>
+            <a:endParaRPr sz="1800">
               <a:solidFill>
                 <a:srgbClr val="000080"/>
               </a:solidFill>
@@ -46710,7 +46811,7 @@
         <p:spPr>
           <a:xfrm>
             <a:off x="1228725" y="85725"/>
-            <a:ext cx="7728600" cy="857400"/>
+            <a:ext cx="7551900" cy="857400"/>
           </a:xfrm>
           <a:prstGeom prst="rect">
             <a:avLst/>
@@ -46733,11 +46834,11 @@
             </a:pPr>
             <a:r>
               <a:rPr lang="en" sz="3200"/>
-              <a:t>The OSG Model</a:t>
+              <a:t>The OSG Model </a:t>
             </a:r>
             <a:r>
               <a:rPr lang="en" sz="3200"/>
-              <a:t> - Collection of Pools</a:t>
+              <a:t>- Leasing the Cloud</a:t>
             </a:r>
             <a:endParaRPr sz="3200"/>
           </a:p>
@@ -46754,7 +46855,7 @@
         <p:spPr>
           <a:xfrm>
             <a:off x="774700" y="1000125"/>
-            <a:ext cx="3618300" cy="3514800"/>
+            <a:ext cx="7772400" cy="3514800"/>
           </a:xfrm>
           <a:prstGeom prst="rect">
             <a:avLst/>
@@ -46785,7 +46886,7 @@
                   <a:srgbClr val="000080"/>
                 </a:solidFill>
               </a:rPr>
-              <a:t>Your OSG pool is just one of many</a:t>
+              <a:t>What if there aren’t enough idle resources?</a:t>
             </a:r>
             <a:endParaRPr sz="2400">
               <a:solidFill>
@@ -46813,7 +46914,7 @@
                   <a:srgbClr val="000080"/>
                 </a:solidFill>
               </a:rPr>
-              <a:t>Separate pools for each Virtual Organization (VO)</a:t>
+              <a:t>Combine overlay system with cloud technology</a:t>
             </a:r>
             <a:endParaRPr sz="2400">
               <a:solidFill>
@@ -46841,7 +46942,38 @@
                   <a:srgbClr val="000080"/>
                 </a:solidFill>
               </a:rPr>
-              <a:t>Your jobs will be running on the OSG VO pool</a:t>
+              <a:t>Some of your OSG jobs may run in the cloud in the next few years</a:t>
+            </a:r>
+            <a:endParaRPr sz="2400">
+              <a:solidFill>
+                <a:srgbClr val="000080"/>
+              </a:solidFill>
+            </a:endParaRPr>
+          </a:p>
+          <a:p>
+            <a:pPr indent="-381000" lvl="0" marL="457200" marR="0" rtl="0" algn="l">
+              <a:lnSpc>
+                <a:spcPct val="100000"/>
+              </a:lnSpc>
+              <a:spcBef>
+                <a:spcPts val="0"/>
+              </a:spcBef>
+              <a:spcAft>
+                <a:spcPts val="0"/>
+              </a:spcAft>
+              <a:buClr>
+                <a:srgbClr val="000080"/>
+              </a:buClr>
+              <a:buSzPts val="2400"/>
+              <a:buChar char="•"/>
+            </a:pPr>
+            <a:r>
+              <a:rPr lang="en" sz="2400">
+                <a:solidFill>
+                  <a:srgbClr val="000080"/>
+                </a:solidFill>
+              </a:rPr>
+              <a:t>… but this should be completely transparent to you</a:t>
             </a:r>
             <a:endParaRPr sz="2400">
               <a:solidFill>
@@ -46895,9 +47027,230 @@
           </a:p>
         </p:txBody>
       </p:sp>
+    </p:spTree>
+  </p:cSld>
+  <p:clrMapOvr>
+    <a:masterClrMapping/>
+  </p:clrMapOvr>
+</p:sld>
+</file>
+
+<file path=ppt/slides/slide32.xml><?xml version="1.0" encoding="utf-8"?>
+<p:sld xmlns:a="http://schemas.openxmlformats.org/drawingml/2006/main" xmlns:r="http://schemas.openxmlformats.org/officeDocument/2006/relationships" xmlns:mc="http://schemas.openxmlformats.org/markup-compatibility/2006" xmlns:mv="urn:schemas-microsoft-com:mac:vml" xmlns:p="http://schemas.openxmlformats.org/presentationml/2006/main" xmlns:c="http://schemas.openxmlformats.org/drawingml/2006/chart" xmlns:dgm="http://schemas.openxmlformats.org/drawingml/2006/diagram" xmlns:o="urn:schemas-microsoft-com:office:office" xmlns:v="urn:schemas-microsoft-com:vml" xmlns:pvml="urn:schemas-microsoft-com:office:powerpoint" xmlns:com="http://schemas.openxmlformats.org/drawingml/2006/compatibility" xmlns:p14="http://schemas.microsoft.com/office/powerpoint/2010/main" xmlns:p15="http://schemas.microsoft.com/office/powerpoint/2012/main">
+  <p:cSld>
+    <p:spTree>
+      <p:nvGrpSpPr>
+        <p:cNvPr id="767" name="Shape 767"/>
+        <p:cNvGrpSpPr/>
+        <p:nvPr/>
+      </p:nvGrpSpPr>
+      <p:grpSpPr>
+        <a:xfrm>
+          <a:off x="0" y="0"/>
+          <a:ext cx="0" cy="0"/>
+          <a:chOff x="0" y="0"/>
+          <a:chExt cx="0" cy="0"/>
+        </a:xfrm>
+      </p:grpSpPr>
       <p:sp>
         <p:nvSpPr>
-          <p:cNvPr id="764" name="Shape 764"/>
+          <p:cNvPr id="768" name="Shape 768"/>
+          <p:cNvSpPr txBox="1"/>
+          <p:nvPr>
+            <p:ph type="title"/>
+          </p:nvPr>
+        </p:nvSpPr>
+        <p:spPr>
+          <a:xfrm>
+            <a:off x="1228725" y="85725"/>
+            <a:ext cx="7728600" cy="857400"/>
+          </a:xfrm>
+          <a:prstGeom prst="rect">
+            <a:avLst/>
+          </a:prstGeom>
+        </p:spPr>
+        <p:txBody>
+          <a:bodyPr anchorCtr="0" anchor="ctr" bIns="91425" lIns="91425" spcFirstLastPara="1" rIns="91425" wrap="square" tIns="91425">
+            <a:noAutofit/>
+          </a:bodyPr>
+          <a:lstStyle/>
+          <a:p>
+            <a:pPr indent="0" lvl="0" marL="0" rtl="0">
+              <a:spcBef>
+                <a:spcPts val="0"/>
+              </a:spcBef>
+              <a:spcAft>
+                <a:spcPts val="0"/>
+              </a:spcAft>
+              <a:buNone/>
+            </a:pPr>
+            <a:r>
+              <a:rPr lang="en" sz="3200"/>
+              <a:t>The OSG Model</a:t>
+            </a:r>
+            <a:r>
+              <a:rPr lang="en" sz="3200"/>
+              <a:t> - Collection of Pools</a:t>
+            </a:r>
+            <a:endParaRPr sz="3200"/>
+          </a:p>
+        </p:txBody>
+      </p:sp>
+      <p:sp>
+        <p:nvSpPr>
+          <p:cNvPr id="769" name="Shape 769"/>
+          <p:cNvSpPr txBox="1"/>
+          <p:nvPr>
+            <p:ph idx="1" type="body"/>
+          </p:nvPr>
+        </p:nvSpPr>
+        <p:spPr>
+          <a:xfrm>
+            <a:off x="774700" y="1000125"/>
+            <a:ext cx="3618300" cy="3514800"/>
+          </a:xfrm>
+          <a:prstGeom prst="rect">
+            <a:avLst/>
+          </a:prstGeom>
+        </p:spPr>
+        <p:txBody>
+          <a:bodyPr anchorCtr="0" anchor="t" bIns="91425" lIns="91425" spcFirstLastPara="1" rIns="91425" wrap="square" tIns="91425">
+            <a:noAutofit/>
+          </a:bodyPr>
+          <a:lstStyle/>
+          <a:p>
+            <a:pPr indent="-381000" lvl="0" marL="457200" marR="0" rtl="0" algn="l">
+              <a:lnSpc>
+                <a:spcPct val="100000"/>
+              </a:lnSpc>
+              <a:spcBef>
+                <a:spcPts val="600"/>
+              </a:spcBef>
+              <a:spcAft>
+                <a:spcPts val="0"/>
+              </a:spcAft>
+              <a:buSzPts val="2400"/>
+              <a:buChar char="•"/>
+            </a:pPr>
+            <a:r>
+              <a:rPr lang="en" sz="2400">
+                <a:solidFill>
+                  <a:srgbClr val="000080"/>
+                </a:solidFill>
+              </a:rPr>
+              <a:t>Your OSG pool is just one of many</a:t>
+            </a:r>
+            <a:endParaRPr sz="2400">
+              <a:solidFill>
+                <a:srgbClr val="000080"/>
+              </a:solidFill>
+            </a:endParaRPr>
+          </a:p>
+          <a:p>
+            <a:pPr indent="-381000" lvl="0" marL="457200" marR="0" rtl="0" algn="l">
+              <a:lnSpc>
+                <a:spcPct val="100000"/>
+              </a:lnSpc>
+              <a:spcBef>
+                <a:spcPts val="0"/>
+              </a:spcBef>
+              <a:spcAft>
+                <a:spcPts val="0"/>
+              </a:spcAft>
+              <a:buSzPts val="2400"/>
+              <a:buChar char="•"/>
+            </a:pPr>
+            <a:r>
+              <a:rPr lang="en" sz="2400">
+                <a:solidFill>
+                  <a:srgbClr val="000080"/>
+                </a:solidFill>
+              </a:rPr>
+              <a:t>Separate pools for each Virtual Organization (VO)</a:t>
+            </a:r>
+            <a:endParaRPr sz="2400">
+              <a:solidFill>
+                <a:srgbClr val="000080"/>
+              </a:solidFill>
+            </a:endParaRPr>
+          </a:p>
+          <a:p>
+            <a:pPr indent="-381000" lvl="0" marL="457200" marR="0" rtl="0" algn="l">
+              <a:lnSpc>
+                <a:spcPct val="100000"/>
+              </a:lnSpc>
+              <a:spcBef>
+                <a:spcPts val="0"/>
+              </a:spcBef>
+              <a:spcAft>
+                <a:spcPts val="0"/>
+              </a:spcAft>
+              <a:buSzPts val="2400"/>
+              <a:buChar char="•"/>
+            </a:pPr>
+            <a:r>
+              <a:rPr lang="en" sz="2400">
+                <a:solidFill>
+                  <a:srgbClr val="000080"/>
+                </a:solidFill>
+              </a:rPr>
+              <a:t>Your jobs will run on the OSG VO pool</a:t>
+            </a:r>
+            <a:endParaRPr sz="2400">
+              <a:solidFill>
+                <a:srgbClr val="000080"/>
+              </a:solidFill>
+            </a:endParaRPr>
+          </a:p>
+        </p:txBody>
+      </p:sp>
+      <p:sp>
+        <p:nvSpPr>
+          <p:cNvPr id="770" name="Shape 770"/>
+          <p:cNvSpPr txBox="1"/>
+          <p:nvPr>
+            <p:ph idx="12" type="sldNum"/>
+          </p:nvPr>
+        </p:nvSpPr>
+        <p:spPr>
+          <a:xfrm>
+            <a:off x="8724900" y="4800600"/>
+            <a:ext cx="419100" cy="342900"/>
+          </a:xfrm>
+          <a:prstGeom prst="rect">
+            <a:avLst/>
+          </a:prstGeom>
+        </p:spPr>
+        <p:txBody>
+          <a:bodyPr anchorCtr="0" anchor="b" bIns="45700" lIns="91425" spcFirstLastPara="1" rIns="91425" wrap="square" tIns="45700">
+            <a:noAutofit/>
+          </a:bodyPr>
+          <a:lstStyle/>
+          <a:p>
+            <a:pPr indent="0" lvl="0" marL="0">
+              <a:spcBef>
+                <a:spcPts val="0"/>
+              </a:spcBef>
+              <a:spcAft>
+                <a:spcPts val="0"/>
+              </a:spcAft>
+              <a:buClr>
+                <a:srgbClr val="FF8000"/>
+              </a:buClr>
+              <a:buFont typeface="Arial"/>
+              <a:buNone/>
+            </a:pPr>
+            <a:fld id="{00000000-1234-1234-1234-123412341234}" type="slidenum">
+              <a:rPr lang="en"/>
+              <a:t>‹#›</a:t>
+            </a:fld>
+            <a:endParaRPr/>
+          </a:p>
+        </p:txBody>
+      </p:sp>
+      <p:sp>
+        <p:nvSpPr>
+          <p:cNvPr id="771" name="Shape 771"/>
           <p:cNvSpPr txBox="1"/>
           <p:nvPr/>
         </p:nvSpPr>
@@ -47022,7 +47375,7 @@
       </p:sp>
       <p:pic>
         <p:nvPicPr>
-          <p:cNvPr id="765" name="Shape 765"/>
+          <p:cNvPr id="772" name="Shape 772"/>
           <p:cNvPicPr preferRelativeResize="0"/>
           <p:nvPr/>
         </p:nvPicPr>
@@ -47047,356 +47400,6 @@
           </a:ln>
         </p:spPr>
       </p:pic>
-    </p:spTree>
-  </p:cSld>
-  <p:clrMapOvr>
-    <a:masterClrMapping/>
-  </p:clrMapOvr>
-</p:sld>
-</file>
-
-<file path=ppt/slides/slide32.xml><?xml version="1.0" encoding="utf-8"?>
-<p:sld xmlns:a="http://schemas.openxmlformats.org/drawingml/2006/main" xmlns:r="http://schemas.openxmlformats.org/officeDocument/2006/relationships" xmlns:mc="http://schemas.openxmlformats.org/markup-compatibility/2006" xmlns:mv="urn:schemas-microsoft-com:mac:vml" xmlns:p="http://schemas.openxmlformats.org/presentationml/2006/main" xmlns:c="http://schemas.openxmlformats.org/drawingml/2006/chart" xmlns:dgm="http://schemas.openxmlformats.org/drawingml/2006/diagram" xmlns:o="urn:schemas-microsoft-com:office:office" xmlns:v="urn:schemas-microsoft-com:vml" xmlns:pvml="urn:schemas-microsoft-com:office:powerpoint" xmlns:com="http://schemas.openxmlformats.org/drawingml/2006/compatibility" xmlns:p14="http://schemas.microsoft.com/office/powerpoint/2010/main" xmlns:p15="http://schemas.microsoft.com/office/powerpoint/2012/main">
-  <p:cSld>
-    <p:spTree>
-      <p:nvGrpSpPr>
-        <p:cNvPr id="769" name="Shape 769"/>
-        <p:cNvGrpSpPr/>
-        <p:nvPr/>
-      </p:nvGrpSpPr>
-      <p:grpSpPr>
-        <a:xfrm>
-          <a:off x="0" y="0"/>
-          <a:ext cx="0" cy="0"/>
-          <a:chOff x="0" y="0"/>
-          <a:chExt cx="0" cy="0"/>
-        </a:xfrm>
-      </p:grpSpPr>
-      <p:sp>
-        <p:nvSpPr>
-          <p:cNvPr id="770" name="Shape 770"/>
-          <p:cNvSpPr txBox="1"/>
-          <p:nvPr>
-            <p:ph type="title"/>
-          </p:nvPr>
-        </p:nvSpPr>
-        <p:spPr>
-          <a:xfrm>
-            <a:off x="1228725" y="85725"/>
-            <a:ext cx="7551900" cy="857400"/>
-          </a:xfrm>
-          <a:prstGeom prst="rect">
-            <a:avLst/>
-          </a:prstGeom>
-        </p:spPr>
-        <p:txBody>
-          <a:bodyPr anchorCtr="0" anchor="ctr" bIns="91425" lIns="91425" spcFirstLastPara="1" rIns="91425" wrap="square" tIns="91425">
-            <a:noAutofit/>
-          </a:bodyPr>
-          <a:lstStyle/>
-          <a:p>
-            <a:pPr indent="0" lvl="0" marL="0" rtl="0">
-              <a:spcBef>
-                <a:spcPts val="0"/>
-              </a:spcBef>
-              <a:spcAft>
-                <a:spcPts val="0"/>
-              </a:spcAft>
-              <a:buNone/>
-            </a:pPr>
-            <a:r>
-              <a:rPr lang="en" sz="3200"/>
-              <a:t>The OSG Model - Getting Access</a:t>
-            </a:r>
-            <a:endParaRPr sz="3200"/>
-          </a:p>
-        </p:txBody>
-      </p:sp>
-      <p:sp>
-        <p:nvSpPr>
-          <p:cNvPr id="771" name="Shape 771"/>
-          <p:cNvSpPr txBox="1"/>
-          <p:nvPr>
-            <p:ph idx="1" type="body"/>
-          </p:nvPr>
-        </p:nvSpPr>
-        <p:spPr>
-          <a:xfrm>
-            <a:off x="774700" y="1000125"/>
-            <a:ext cx="7772400" cy="3514800"/>
-          </a:xfrm>
-          <a:prstGeom prst="rect">
-            <a:avLst/>
-          </a:prstGeom>
-        </p:spPr>
-        <p:txBody>
-          <a:bodyPr anchorCtr="0" anchor="t" bIns="91425" lIns="91425" spcFirstLastPara="1" rIns="91425" wrap="square" tIns="91425">
-            <a:noAutofit/>
-          </a:bodyPr>
-          <a:lstStyle/>
-          <a:p>
-            <a:pPr indent="-381000" lvl="0" marL="457200" marR="0" rtl="0" algn="l">
-              <a:lnSpc>
-                <a:spcPct val="100000"/>
-              </a:lnSpc>
-              <a:spcBef>
-                <a:spcPts val="600"/>
-              </a:spcBef>
-              <a:spcAft>
-                <a:spcPts val="0"/>
-              </a:spcAft>
-              <a:buClr>
-                <a:srgbClr val="000080"/>
-              </a:buClr>
-              <a:buSzPts val="2400"/>
-              <a:buChar char="•"/>
-            </a:pPr>
-            <a:r>
-              <a:rPr lang="en" sz="2400">
-                <a:solidFill>
-                  <a:srgbClr val="000080"/>
-                </a:solidFill>
-              </a:rPr>
-              <a:t>During the school:</a:t>
-            </a:r>
-            <a:endParaRPr sz="2400">
-              <a:solidFill>
-                <a:srgbClr val="000080"/>
-              </a:solidFill>
-            </a:endParaRPr>
-          </a:p>
-          <a:p>
-            <a:pPr indent="-342900" lvl="1" marL="914400" marR="0" rtl="0" algn="l">
-              <a:lnSpc>
-                <a:spcPct val="100000"/>
-              </a:lnSpc>
-              <a:spcBef>
-                <a:spcPts val="0"/>
-              </a:spcBef>
-              <a:spcAft>
-                <a:spcPts val="0"/>
-              </a:spcAft>
-              <a:buClr>
-                <a:srgbClr val="000080"/>
-              </a:buClr>
-              <a:buSzPts val="1800"/>
-              <a:buChar char="−"/>
-            </a:pPr>
-            <a:r>
-              <a:rPr lang="en" sz="1800">
-                <a:solidFill>
-                  <a:srgbClr val="000080"/>
-                </a:solidFill>
-              </a:rPr>
-              <a:t>OSG submit node at UW (exercises)</a:t>
-            </a:r>
-            <a:endParaRPr sz="1800">
-              <a:solidFill>
-                <a:srgbClr val="000080"/>
-              </a:solidFill>
-            </a:endParaRPr>
-          </a:p>
-          <a:p>
-            <a:pPr indent="-342900" lvl="1" marL="914400" marR="0" rtl="0" algn="l">
-              <a:lnSpc>
-                <a:spcPct val="100000"/>
-              </a:lnSpc>
-              <a:spcBef>
-                <a:spcPts val="0"/>
-              </a:spcBef>
-              <a:spcAft>
-                <a:spcPts val="0"/>
-              </a:spcAft>
-              <a:buClr>
-                <a:srgbClr val="000080"/>
-              </a:buClr>
-              <a:buSzPts val="1800"/>
-              <a:buChar char="−"/>
-            </a:pPr>
-            <a:r>
-              <a:rPr lang="en" sz="1800">
-                <a:solidFill>
-                  <a:srgbClr val="000080"/>
-                </a:solidFill>
-              </a:rPr>
-              <a:t>OSG submit node via OSG Connect (Thursday)</a:t>
-            </a:r>
-            <a:endParaRPr sz="1800">
-              <a:solidFill>
-                <a:srgbClr val="000080"/>
-              </a:solidFill>
-            </a:endParaRPr>
-          </a:p>
-          <a:p>
-            <a:pPr indent="-381000" lvl="0" marL="457200" marR="0" rtl="0" algn="l">
-              <a:lnSpc>
-                <a:spcPct val="100000"/>
-              </a:lnSpc>
-              <a:spcBef>
-                <a:spcPts val="0"/>
-              </a:spcBef>
-              <a:spcAft>
-                <a:spcPts val="0"/>
-              </a:spcAft>
-              <a:buClr>
-                <a:srgbClr val="000080"/>
-              </a:buClr>
-              <a:buSzPts val="2400"/>
-              <a:buChar char="•"/>
-            </a:pPr>
-            <a:r>
-              <a:rPr lang="en" sz="2400">
-                <a:solidFill>
-                  <a:srgbClr val="000080"/>
-                </a:solidFill>
-              </a:rPr>
-              <a:t>After the school:</a:t>
-            </a:r>
-            <a:endParaRPr sz="2400">
-              <a:solidFill>
-                <a:srgbClr val="000080"/>
-              </a:solidFill>
-            </a:endParaRPr>
-          </a:p>
-          <a:p>
-            <a:pPr indent="-342900" lvl="1" marL="914400" marR="0" rtl="0" algn="l">
-              <a:lnSpc>
-                <a:spcPct val="100000"/>
-              </a:lnSpc>
-              <a:spcBef>
-                <a:spcPts val="0"/>
-              </a:spcBef>
-              <a:spcAft>
-                <a:spcPts val="0"/>
-              </a:spcAft>
-              <a:buClr>
-                <a:srgbClr val="000080"/>
-              </a:buClr>
-              <a:buSzPts val="1800"/>
-              <a:buChar char="−"/>
-            </a:pPr>
-            <a:r>
-              <a:rPr lang="en" sz="1800">
-                <a:solidFill>
-                  <a:srgbClr val="000080"/>
-                </a:solidFill>
-              </a:rPr>
-              <a:t>Both of the above</a:t>
-            </a:r>
-            <a:endParaRPr sz="1800">
-              <a:solidFill>
-                <a:srgbClr val="000080"/>
-              </a:solidFill>
-            </a:endParaRPr>
-          </a:p>
-          <a:p>
-            <a:pPr indent="-342900" lvl="1" marL="914400" marR="0" rtl="0" algn="l">
-              <a:lnSpc>
-                <a:spcPct val="100000"/>
-              </a:lnSpc>
-              <a:spcBef>
-                <a:spcPts val="0"/>
-              </a:spcBef>
-              <a:spcAft>
-                <a:spcPts val="0"/>
-              </a:spcAft>
-              <a:buClr>
-                <a:srgbClr val="000080"/>
-              </a:buClr>
-              <a:buSzPts val="1800"/>
-              <a:buChar char="−"/>
-            </a:pPr>
-            <a:r>
-              <a:rPr lang="en" sz="1800">
-                <a:solidFill>
-                  <a:srgbClr val="000080"/>
-                </a:solidFill>
-              </a:rPr>
-              <a:t>VO-hosted submit nodes</a:t>
-            </a:r>
-            <a:endParaRPr sz="1800">
-              <a:solidFill>
-                <a:srgbClr val="000080"/>
-              </a:solidFill>
-            </a:endParaRPr>
-          </a:p>
-          <a:p>
-            <a:pPr indent="-342900" lvl="1" marL="914400" marR="0" rtl="0" algn="l">
-              <a:lnSpc>
-                <a:spcPct val="100000"/>
-              </a:lnSpc>
-              <a:spcBef>
-                <a:spcPts val="0"/>
-              </a:spcBef>
-              <a:spcAft>
-                <a:spcPts val="0"/>
-              </a:spcAft>
-              <a:buClr>
-                <a:srgbClr val="000080"/>
-              </a:buClr>
-              <a:buSzPts val="1800"/>
-              <a:buChar char="−"/>
-            </a:pPr>
-            <a:r>
-              <a:rPr lang="en" sz="1800">
-                <a:solidFill>
-                  <a:srgbClr val="000080"/>
-                </a:solidFill>
-              </a:rPr>
-              <a:t>Institution integration with the OSG</a:t>
-            </a:r>
-            <a:endParaRPr sz="1800">
-              <a:solidFill>
-                <a:srgbClr val="000080"/>
-              </a:solidFill>
-            </a:endParaRPr>
-          </a:p>
-        </p:txBody>
-      </p:sp>
-      <p:sp>
-        <p:nvSpPr>
-          <p:cNvPr id="772" name="Shape 772"/>
-          <p:cNvSpPr txBox="1"/>
-          <p:nvPr>
-            <p:ph idx="12" type="sldNum"/>
-          </p:nvPr>
-        </p:nvSpPr>
-        <p:spPr>
-          <a:xfrm>
-            <a:off x="8724900" y="4800600"/>
-            <a:ext cx="419100" cy="342900"/>
-          </a:xfrm>
-          <a:prstGeom prst="rect">
-            <a:avLst/>
-          </a:prstGeom>
-        </p:spPr>
-        <p:txBody>
-          <a:bodyPr anchorCtr="0" anchor="b" bIns="45700" lIns="91425" spcFirstLastPara="1" rIns="91425" wrap="square" tIns="45700">
-            <a:noAutofit/>
-          </a:bodyPr>
-          <a:lstStyle/>
-          <a:p>
-            <a:pPr indent="0" lvl="0" marL="0" rtl="0">
-              <a:spcBef>
-                <a:spcPts val="0"/>
-              </a:spcBef>
-              <a:spcAft>
-                <a:spcPts val="0"/>
-              </a:spcAft>
-              <a:buClr>
-                <a:srgbClr val="FF8000"/>
-              </a:buClr>
-              <a:buFont typeface="Arial"/>
-              <a:buNone/>
-            </a:pPr>
-            <a:fld id="{00000000-1234-1234-1234-123412341234}" type="slidenum">
-              <a:rPr lang="en"/>
-              <a:t>‹#›</a:t>
-            </a:fld>
-            <a:endParaRPr/>
-          </a:p>
-        </p:txBody>
-      </p:sp>
     </p:spTree>
   </p:cSld>
   <p:clrMapOvr>
@@ -47427,6 +47430,356 @@
           <p:cNvPr id="777" name="Shape 777"/>
           <p:cNvSpPr txBox="1"/>
           <p:nvPr>
+            <p:ph type="title"/>
+          </p:nvPr>
+        </p:nvSpPr>
+        <p:spPr>
+          <a:xfrm>
+            <a:off x="1228725" y="85725"/>
+            <a:ext cx="7551900" cy="857400"/>
+          </a:xfrm>
+          <a:prstGeom prst="rect">
+            <a:avLst/>
+          </a:prstGeom>
+        </p:spPr>
+        <p:txBody>
+          <a:bodyPr anchorCtr="0" anchor="ctr" bIns="91425" lIns="91425" spcFirstLastPara="1" rIns="91425" wrap="square" tIns="91425">
+            <a:noAutofit/>
+          </a:bodyPr>
+          <a:lstStyle/>
+          <a:p>
+            <a:pPr indent="0" lvl="0" marL="0" rtl="0">
+              <a:spcBef>
+                <a:spcPts val="0"/>
+              </a:spcBef>
+              <a:spcAft>
+                <a:spcPts val="0"/>
+              </a:spcAft>
+              <a:buNone/>
+            </a:pPr>
+            <a:r>
+              <a:rPr lang="en" sz="3200"/>
+              <a:t>The OSG Model - Getting Access</a:t>
+            </a:r>
+            <a:endParaRPr sz="3200"/>
+          </a:p>
+        </p:txBody>
+      </p:sp>
+      <p:sp>
+        <p:nvSpPr>
+          <p:cNvPr id="778" name="Shape 778"/>
+          <p:cNvSpPr txBox="1"/>
+          <p:nvPr>
+            <p:ph idx="1" type="body"/>
+          </p:nvPr>
+        </p:nvSpPr>
+        <p:spPr>
+          <a:xfrm>
+            <a:off x="774700" y="1000125"/>
+            <a:ext cx="7772400" cy="3514800"/>
+          </a:xfrm>
+          <a:prstGeom prst="rect">
+            <a:avLst/>
+          </a:prstGeom>
+        </p:spPr>
+        <p:txBody>
+          <a:bodyPr anchorCtr="0" anchor="t" bIns="91425" lIns="91425" spcFirstLastPara="1" rIns="91425" wrap="square" tIns="91425">
+            <a:noAutofit/>
+          </a:bodyPr>
+          <a:lstStyle/>
+          <a:p>
+            <a:pPr indent="-381000" lvl="0" marL="457200" marR="0" rtl="0" algn="l">
+              <a:lnSpc>
+                <a:spcPct val="100000"/>
+              </a:lnSpc>
+              <a:spcBef>
+                <a:spcPts val="600"/>
+              </a:spcBef>
+              <a:spcAft>
+                <a:spcPts val="0"/>
+              </a:spcAft>
+              <a:buClr>
+                <a:srgbClr val="000080"/>
+              </a:buClr>
+              <a:buSzPts val="2400"/>
+              <a:buChar char="•"/>
+            </a:pPr>
+            <a:r>
+              <a:rPr lang="en" sz="2400">
+                <a:solidFill>
+                  <a:srgbClr val="000080"/>
+                </a:solidFill>
+              </a:rPr>
+              <a:t>During the school:</a:t>
+            </a:r>
+            <a:endParaRPr sz="2400">
+              <a:solidFill>
+                <a:srgbClr val="000080"/>
+              </a:solidFill>
+            </a:endParaRPr>
+          </a:p>
+          <a:p>
+            <a:pPr indent="-342900" lvl="1" marL="914400" marR="0" rtl="0" algn="l">
+              <a:lnSpc>
+                <a:spcPct val="100000"/>
+              </a:lnSpc>
+              <a:spcBef>
+                <a:spcPts val="0"/>
+              </a:spcBef>
+              <a:spcAft>
+                <a:spcPts val="0"/>
+              </a:spcAft>
+              <a:buClr>
+                <a:srgbClr val="000080"/>
+              </a:buClr>
+              <a:buSzPts val="1800"/>
+              <a:buChar char="−"/>
+            </a:pPr>
+            <a:r>
+              <a:rPr lang="en" sz="1800">
+                <a:solidFill>
+                  <a:srgbClr val="000080"/>
+                </a:solidFill>
+              </a:rPr>
+              <a:t>OSG submit node at UW (exercises)</a:t>
+            </a:r>
+            <a:endParaRPr sz="1800">
+              <a:solidFill>
+                <a:srgbClr val="000080"/>
+              </a:solidFill>
+            </a:endParaRPr>
+          </a:p>
+          <a:p>
+            <a:pPr indent="-342900" lvl="1" marL="914400" marR="0" rtl="0" algn="l">
+              <a:lnSpc>
+                <a:spcPct val="100000"/>
+              </a:lnSpc>
+              <a:spcBef>
+                <a:spcPts val="0"/>
+              </a:spcBef>
+              <a:spcAft>
+                <a:spcPts val="0"/>
+              </a:spcAft>
+              <a:buClr>
+                <a:srgbClr val="000080"/>
+              </a:buClr>
+              <a:buSzPts val="1800"/>
+              <a:buChar char="−"/>
+            </a:pPr>
+            <a:r>
+              <a:rPr lang="en" sz="1800">
+                <a:solidFill>
+                  <a:srgbClr val="000080"/>
+                </a:solidFill>
+              </a:rPr>
+              <a:t>OSG submit node via OSG Connect (Thursday)</a:t>
+            </a:r>
+            <a:endParaRPr sz="1800">
+              <a:solidFill>
+                <a:srgbClr val="000080"/>
+              </a:solidFill>
+            </a:endParaRPr>
+          </a:p>
+          <a:p>
+            <a:pPr indent="-381000" lvl="0" marL="457200" marR="0" rtl="0" algn="l">
+              <a:lnSpc>
+                <a:spcPct val="100000"/>
+              </a:lnSpc>
+              <a:spcBef>
+                <a:spcPts val="0"/>
+              </a:spcBef>
+              <a:spcAft>
+                <a:spcPts val="0"/>
+              </a:spcAft>
+              <a:buClr>
+                <a:srgbClr val="000080"/>
+              </a:buClr>
+              <a:buSzPts val="2400"/>
+              <a:buChar char="•"/>
+            </a:pPr>
+            <a:r>
+              <a:rPr lang="en" sz="2400">
+                <a:solidFill>
+                  <a:srgbClr val="000080"/>
+                </a:solidFill>
+              </a:rPr>
+              <a:t>After the school:</a:t>
+            </a:r>
+            <a:endParaRPr sz="2400">
+              <a:solidFill>
+                <a:srgbClr val="000080"/>
+              </a:solidFill>
+            </a:endParaRPr>
+          </a:p>
+          <a:p>
+            <a:pPr indent="-342900" lvl="1" marL="914400" marR="0" rtl="0" algn="l">
+              <a:lnSpc>
+                <a:spcPct val="100000"/>
+              </a:lnSpc>
+              <a:spcBef>
+                <a:spcPts val="0"/>
+              </a:spcBef>
+              <a:spcAft>
+                <a:spcPts val="0"/>
+              </a:spcAft>
+              <a:buClr>
+                <a:srgbClr val="000080"/>
+              </a:buClr>
+              <a:buSzPts val="1800"/>
+              <a:buChar char="−"/>
+            </a:pPr>
+            <a:r>
+              <a:rPr lang="en" sz="1800">
+                <a:solidFill>
+                  <a:srgbClr val="000080"/>
+                </a:solidFill>
+              </a:rPr>
+              <a:t>Both of the above</a:t>
+            </a:r>
+            <a:endParaRPr sz="1800">
+              <a:solidFill>
+                <a:srgbClr val="000080"/>
+              </a:solidFill>
+            </a:endParaRPr>
+          </a:p>
+          <a:p>
+            <a:pPr indent="-342900" lvl="1" marL="914400" marR="0" rtl="0" algn="l">
+              <a:lnSpc>
+                <a:spcPct val="100000"/>
+              </a:lnSpc>
+              <a:spcBef>
+                <a:spcPts val="0"/>
+              </a:spcBef>
+              <a:spcAft>
+                <a:spcPts val="0"/>
+              </a:spcAft>
+              <a:buClr>
+                <a:srgbClr val="000080"/>
+              </a:buClr>
+              <a:buSzPts val="1800"/>
+              <a:buChar char="−"/>
+            </a:pPr>
+            <a:r>
+              <a:rPr lang="en" sz="1800">
+                <a:solidFill>
+                  <a:srgbClr val="000080"/>
+                </a:solidFill>
+              </a:rPr>
+              <a:t>VO-hosted submit nodes</a:t>
+            </a:r>
+            <a:endParaRPr sz="1800">
+              <a:solidFill>
+                <a:srgbClr val="000080"/>
+              </a:solidFill>
+            </a:endParaRPr>
+          </a:p>
+          <a:p>
+            <a:pPr indent="-342900" lvl="1" marL="914400" marR="0" rtl="0" algn="l">
+              <a:lnSpc>
+                <a:spcPct val="100000"/>
+              </a:lnSpc>
+              <a:spcBef>
+                <a:spcPts val="0"/>
+              </a:spcBef>
+              <a:spcAft>
+                <a:spcPts val="0"/>
+              </a:spcAft>
+              <a:buClr>
+                <a:srgbClr val="000080"/>
+              </a:buClr>
+              <a:buSzPts val="1800"/>
+              <a:buChar char="−"/>
+            </a:pPr>
+            <a:r>
+              <a:rPr lang="en" sz="1800">
+                <a:solidFill>
+                  <a:srgbClr val="000080"/>
+                </a:solidFill>
+              </a:rPr>
+              <a:t>Institution integration with the OSG</a:t>
+            </a:r>
+            <a:endParaRPr sz="1800">
+              <a:solidFill>
+                <a:srgbClr val="000080"/>
+              </a:solidFill>
+            </a:endParaRPr>
+          </a:p>
+        </p:txBody>
+      </p:sp>
+      <p:sp>
+        <p:nvSpPr>
+          <p:cNvPr id="779" name="Shape 779"/>
+          <p:cNvSpPr txBox="1"/>
+          <p:nvPr>
+            <p:ph idx="12" type="sldNum"/>
+          </p:nvPr>
+        </p:nvSpPr>
+        <p:spPr>
+          <a:xfrm>
+            <a:off x="8724900" y="4800600"/>
+            <a:ext cx="419100" cy="342900"/>
+          </a:xfrm>
+          <a:prstGeom prst="rect">
+            <a:avLst/>
+          </a:prstGeom>
+        </p:spPr>
+        <p:txBody>
+          <a:bodyPr anchorCtr="0" anchor="b" bIns="45700" lIns="91425" spcFirstLastPara="1" rIns="91425" wrap="square" tIns="45700">
+            <a:noAutofit/>
+          </a:bodyPr>
+          <a:lstStyle/>
+          <a:p>
+            <a:pPr indent="0" lvl="0" marL="0" rtl="0">
+              <a:spcBef>
+                <a:spcPts val="0"/>
+              </a:spcBef>
+              <a:spcAft>
+                <a:spcPts val="0"/>
+              </a:spcAft>
+              <a:buClr>
+                <a:srgbClr val="FF8000"/>
+              </a:buClr>
+              <a:buFont typeface="Arial"/>
+              <a:buNone/>
+            </a:pPr>
+            <a:fld id="{00000000-1234-1234-1234-123412341234}" type="slidenum">
+              <a:rPr lang="en"/>
+              <a:t>‹#›</a:t>
+            </a:fld>
+            <a:endParaRPr/>
+          </a:p>
+        </p:txBody>
+      </p:sp>
+    </p:spTree>
+  </p:cSld>
+  <p:clrMapOvr>
+    <a:masterClrMapping/>
+  </p:clrMapOvr>
+</p:sld>
+</file>
+
+<file path=ppt/slides/slide34.xml><?xml version="1.0" encoding="utf-8"?>
+<p:sld xmlns:a="http://schemas.openxmlformats.org/drawingml/2006/main" xmlns:r="http://schemas.openxmlformats.org/officeDocument/2006/relationships" xmlns:mc="http://schemas.openxmlformats.org/markup-compatibility/2006" xmlns:mv="urn:schemas-microsoft-com:mac:vml" xmlns:p="http://schemas.openxmlformats.org/presentationml/2006/main" xmlns:c="http://schemas.openxmlformats.org/drawingml/2006/chart" xmlns:dgm="http://schemas.openxmlformats.org/drawingml/2006/diagram" xmlns:o="urn:schemas-microsoft-com:office:office" xmlns:v="urn:schemas-microsoft-com:vml" xmlns:pvml="urn:schemas-microsoft-com:office:powerpoint" xmlns:com="http://schemas.openxmlformats.org/drawingml/2006/compatibility" xmlns:p14="http://schemas.microsoft.com/office/powerpoint/2010/main" xmlns:p15="http://schemas.microsoft.com/office/powerpoint/2012/main">
+  <p:cSld>
+    <p:spTree>
+      <p:nvGrpSpPr>
+        <p:cNvPr id="783" name="Shape 783"/>
+        <p:cNvGrpSpPr/>
+        <p:nvPr/>
+      </p:nvGrpSpPr>
+      <p:grpSpPr>
+        <a:xfrm>
+          <a:off x="0" y="0"/>
+          <a:ext cx="0" cy="0"/>
+          <a:chOff x="0" y="0"/>
+          <a:chExt cx="0" cy="0"/>
+        </a:xfrm>
+      </p:grpSpPr>
+      <p:sp>
+        <p:nvSpPr>
+          <p:cNvPr id="784" name="Shape 784"/>
+          <p:cNvSpPr txBox="1"/>
+          <p:nvPr>
             <p:ph idx="4294967295" type="subTitle"/>
           </p:nvPr>
         </p:nvSpPr>
@@ -47472,7 +47825,7 @@
       </p:sp>
       <p:sp>
         <p:nvSpPr>
-          <p:cNvPr id="778" name="Shape 778"/>
+          <p:cNvPr id="785" name="Shape 785"/>
           <p:cNvSpPr txBox="1"/>
           <p:nvPr>
             <p:ph idx="12" type="sldNum"/>
@@ -48893,9 +49246,9 @@
 </file>
 
 <file path=ppt/theme/theme1.xml><?xml version="1.0" encoding="utf-8"?>
-<a:theme xmlns:a="http://schemas.openxmlformats.org/drawingml/2006/main" xmlns:r="http://schemas.openxmlformats.org/officeDocument/2006/relationships" name="OSG-Summer-School-Template">
+<a:theme xmlns:a="http://schemas.openxmlformats.org/drawingml/2006/main" xmlns:r="http://schemas.openxmlformats.org/officeDocument/2006/relationships">
   <a:themeElements>
-    <a:clrScheme name="">
+    <a:clrScheme name="Default">
       <a:dk1>
         <a:srgbClr val="000000"/>
       </a:dk1>
@@ -48903,34 +49256,34 @@
         <a:srgbClr val="FFFFFF"/>
       </a:lt1>
       <a:dk2>
-        <a:srgbClr val="23005F"/>
+        <a:srgbClr val="158158"/>
       </a:dk2>
       <a:lt2>
-        <a:srgbClr val="808080"/>
+        <a:srgbClr val="F3F3F3"/>
       </a:lt2>
       <a:accent1>
-        <a:srgbClr val="C70000"/>
+        <a:srgbClr val="058DC7"/>
       </a:accent1>
       <a:accent2>
-        <a:srgbClr val="5554FF"/>
+        <a:srgbClr val="50B432"/>
       </a:accent2>
       <a:accent3>
-        <a:srgbClr val="FFFFFF"/>
+        <a:srgbClr val="ED561B"/>
       </a:accent3>
       <a:accent4>
-        <a:srgbClr val="000000"/>
+        <a:srgbClr val="EDEF00"/>
       </a:accent4>
       <a:accent5>
-        <a:srgbClr val="E0AAAA"/>
+        <a:srgbClr val="24CBE5"/>
       </a:accent5>
       <a:accent6>
-        <a:srgbClr val="4C4BE7"/>
+        <a:srgbClr val="64E572"/>
       </a:accent6>
       <a:hlink>
-        <a:srgbClr val="111A99"/>
+        <a:srgbClr val="2200CC"/>
       </a:hlink>
       <a:folHlink>
-        <a:srgbClr val="99CC00"/>
+        <a:srgbClr val="551A8B"/>
       </a:folHlink>
     </a:clrScheme>
     <a:fontScheme name="Office">
@@ -49451,9 +49804,9 @@
 </file>
 
 <file path=ppt/theme/theme3.xml><?xml version="1.0" encoding="utf-8"?>
-<a:theme xmlns:a="http://schemas.openxmlformats.org/drawingml/2006/main" xmlns:r="http://schemas.openxmlformats.org/officeDocument/2006/relationships">
+<a:theme xmlns:a="http://schemas.openxmlformats.org/drawingml/2006/main" xmlns:r="http://schemas.openxmlformats.org/officeDocument/2006/relationships" name="OSG-Summer-School-Template">
   <a:themeElements>
-    <a:clrScheme name="Default">
+    <a:clrScheme name="">
       <a:dk1>
         <a:srgbClr val="000000"/>
       </a:dk1>
@@ -49461,34 +49814,34 @@
         <a:srgbClr val="FFFFFF"/>
       </a:lt1>
       <a:dk2>
-        <a:srgbClr val="158158"/>
+        <a:srgbClr val="23005F"/>
       </a:dk2>
       <a:lt2>
-        <a:srgbClr val="F3F3F3"/>
+        <a:srgbClr val="808080"/>
       </a:lt2>
       <a:accent1>
-        <a:srgbClr val="058DC7"/>
+        <a:srgbClr val="C70000"/>
       </a:accent1>
       <a:accent2>
-        <a:srgbClr val="50B432"/>
+        <a:srgbClr val="5554FF"/>
       </a:accent2>
       <a:accent3>
-        <a:srgbClr val="ED561B"/>
+        <a:srgbClr val="FFFFFF"/>
       </a:accent3>
       <a:accent4>
-        <a:srgbClr val="EDEF00"/>
+        <a:srgbClr val="000000"/>
       </a:accent4>
       <a:accent5>
-        <a:srgbClr val="24CBE5"/>
+        <a:srgbClr val="E0AAAA"/>
       </a:accent5>
       <a:accent6>
-        <a:srgbClr val="64E572"/>
+        <a:srgbClr val="4C4BE7"/>
       </a:accent6>
       <a:hlink>
-        <a:srgbClr val="2200CC"/>
+        <a:srgbClr val="111A99"/>
       </a:hlink>
       <a:folHlink>
-        <a:srgbClr val="551A8B"/>
+        <a:srgbClr val="99CC00"/>
       </a:folHlink>
     </a:clrScheme>
     <a:fontScheme name="Office">

</xml_diff>